<commit_message>
bgl and lemon implementation added
</commit_message>
<xml_diff>
--- a/reports/exp-2-report.pptx
+++ b/reports/exp-2-report.pptx
@@ -7,6 +7,7 @@
   <p:sldIdLst>
     <p:sldId id="256" r:id="rId2"/>
     <p:sldId id="257" r:id="rId3"/>
+    <p:sldId id="258" r:id="rId4"/>
   </p:sldIdLst>
   <p:sldSz cx="12192000" cy="6858000"/>
   <p:notesSz cx="6858000" cy="9144000"/>
@@ -3472,7 +3473,7 @@
         <p:spPr/>
         <p:txBody>
           <a:bodyPr>
-            <a:normAutofit fontScale="92500" lnSpcReduction="20000"/>
+            <a:normAutofit lnSpcReduction="10000"/>
           </a:bodyPr>
           <a:lstStyle/>
           <a:p>
@@ -3485,14 +3486,14 @@
             <a:pPr lvl="1"/>
             <a:r>
               <a:rPr lang="en-IN" dirty="0"/>
-              <a:t>Generic implementation – super source</a:t>
+              <a:t>Super source without demand</a:t>
             </a:r>
           </a:p>
           <a:p>
             <a:pPr lvl="1"/>
             <a:r>
               <a:rPr lang="en-IN" dirty="0"/>
-              <a:t>Trivial implementation</a:t>
+              <a:t>Super source with demand – augment capacity of edges to get 0 net demand</a:t>
             </a:r>
           </a:p>
           <a:p>
@@ -3507,7 +3508,10 @@
               <a:rPr lang="en-IN" dirty="0" err="1"/>
               <a:t>max_flow_min_cost</a:t>
             </a:r>
-            <a:endParaRPr lang="en-IN" dirty="0"/>
+            <a:r>
+              <a:rPr lang="en-IN" dirty="0"/>
+              <a:t> – infinite source assumed</a:t>
+            </a:r>
           </a:p>
           <a:p>
             <a:pPr lvl="1"/>
@@ -3515,7 +3519,10 @@
               <a:rPr lang="en-IN" dirty="0" err="1"/>
               <a:t>Network_simplex</a:t>
             </a:r>
-            <a:endParaRPr lang="en-IN" dirty="0"/>
+            <a:r>
+              <a:rPr lang="en-IN" dirty="0"/>
+              <a:t> – net demand = 0</a:t>
+            </a:r>
           </a:p>
           <a:p>
             <a:pPr lvl="1"/>
@@ -3523,67 +3530,37 @@
               <a:rPr lang="en-IN" dirty="0" err="1"/>
               <a:t>Capacity_scaling</a:t>
             </a:r>
-            <a:endParaRPr lang="en-IN" dirty="0"/>
-          </a:p>
-          <a:p>
             <a:r>
               <a:rPr lang="en-IN" dirty="0"/>
-              <a:t>6 Datapoints:</a:t>
+              <a:t> – net demand = 0</a:t>
+            </a:r>
+          </a:p>
+          <a:p>
+            <a:r>
+              <a:rPr lang="en-IN" dirty="0"/>
+              <a:t>3 Datapoints:</a:t>
             </a:r>
           </a:p>
           <a:p>
             <a:pPr lvl="1"/>
             <a:r>
               <a:rPr lang="en-IN" dirty="0"/>
-              <a:t>Ss – </a:t>
-            </a:r>
-            <a:r>
-              <a:rPr lang="en-IN" dirty="0" err="1"/>
-              <a:t>mfmc</a:t>
-            </a:r>
-            <a:endParaRPr lang="en-IN" dirty="0"/>
+              <a:t>WO demand – MFMC</a:t>
+            </a:r>
           </a:p>
           <a:p>
             <a:pPr lvl="1"/>
             <a:r>
               <a:rPr lang="en-IN" dirty="0"/>
-              <a:t>ss – </a:t>
-            </a:r>
-            <a:r>
-              <a:rPr lang="en-IN" dirty="0" err="1"/>
-              <a:t>nc</a:t>
-            </a:r>
-            <a:endParaRPr lang="en-IN" dirty="0"/>
+              <a:t>W demand – network simplex</a:t>
+            </a:r>
           </a:p>
           <a:p>
             <a:pPr lvl="1"/>
             <a:r>
               <a:rPr lang="en-IN" dirty="0"/>
-              <a:t>ss – cc</a:t>
-            </a:r>
-          </a:p>
-          <a:p>
-            <a:pPr lvl="1"/>
-            <a:r>
-              <a:rPr lang="en-IN" dirty="0"/>
-              <a:t>Tr – </a:t>
-            </a:r>
-            <a:r>
-              <a:rPr lang="en-IN" dirty="0" err="1"/>
-              <a:t>nc</a:t>
-            </a:r>
-            <a:endParaRPr lang="en-IN" dirty="0"/>
-          </a:p>
-          <a:p>
-            <a:pPr lvl="1"/>
-            <a:r>
-              <a:rPr lang="en-IN" dirty="0"/>
-              <a:t>Tr – cc</a:t>
-            </a:r>
-          </a:p>
-          <a:p>
-            <a:pPr lvl="1"/>
-            <a:endParaRPr lang="en-IN" dirty="0"/>
+              <a:t>W demand – capacity scaling</a:t>
+            </a:r>
           </a:p>
         </p:txBody>
       </p:sp>
@@ -3591,6 +3568,179 @@
     <p:extLst>
       <p:ext uri="{BB962C8B-B14F-4D97-AF65-F5344CB8AC3E}">
         <p14:creationId xmlns:p14="http://schemas.microsoft.com/office/powerpoint/2010/main" val="1502459411"/>
+      </p:ext>
+    </p:extLst>
+  </p:cSld>
+  <p:clrMapOvr>
+    <a:masterClrMapping/>
+  </p:clrMapOvr>
+</p:sld>
+</file>
+
+<file path=ppt/slides/slide3.xml><?xml version="1.0" encoding="utf-8"?>
+<p:sld xmlns:a="http://schemas.openxmlformats.org/drawingml/2006/main" xmlns:r="http://schemas.openxmlformats.org/officeDocument/2006/relationships" xmlns:p="http://schemas.openxmlformats.org/presentationml/2006/main">
+  <p:cSld>
+    <p:spTree>
+      <p:nvGrpSpPr>
+        <p:cNvPr id="1" name=""/>
+        <p:cNvGrpSpPr/>
+        <p:nvPr/>
+      </p:nvGrpSpPr>
+      <p:grpSpPr>
+        <a:xfrm>
+          <a:off x="0" y="0"/>
+          <a:ext cx="0" cy="0"/>
+          <a:chOff x="0" y="0"/>
+          <a:chExt cx="0" cy="0"/>
+        </a:xfrm>
+      </p:grpSpPr>
+      <p:sp>
+        <p:nvSpPr>
+          <p:cNvPr id="2" name="Title 1">
+            <a:extLst>
+              <a:ext uri="{FF2B5EF4-FFF2-40B4-BE49-F238E27FC236}">
+                <a16:creationId xmlns:a16="http://schemas.microsoft.com/office/drawing/2014/main" id="{C7C60137-F396-4F53-BD7F-7FB1B07B3854}"/>
+              </a:ext>
+            </a:extLst>
+          </p:cNvPr>
+          <p:cNvSpPr>
+            <a:spLocks noGrp="1"/>
+          </p:cNvSpPr>
+          <p:nvPr>
+            <p:ph type="title"/>
+          </p:nvPr>
+        </p:nvSpPr>
+        <p:spPr/>
+        <p:txBody>
+          <a:bodyPr/>
+          <a:lstStyle/>
+          <a:p>
+            <a:endParaRPr lang="en-IN"/>
+          </a:p>
+        </p:txBody>
+      </p:sp>
+      <p:sp>
+        <p:nvSpPr>
+          <p:cNvPr id="3" name="Content Placeholder 2">
+            <a:extLst>
+              <a:ext uri="{FF2B5EF4-FFF2-40B4-BE49-F238E27FC236}">
+                <a16:creationId xmlns:a16="http://schemas.microsoft.com/office/drawing/2014/main" id="{EFD6F4ED-9890-45A6-B940-B3D8EE900889}"/>
+              </a:ext>
+            </a:extLst>
+          </p:cNvPr>
+          <p:cNvSpPr>
+            <a:spLocks noGrp="1"/>
+          </p:cNvSpPr>
+          <p:nvPr>
+            <p:ph idx="1"/>
+          </p:nvPr>
+        </p:nvSpPr>
+        <p:spPr/>
+        <p:txBody>
+          <a:bodyPr/>
+          <a:lstStyle/>
+          <a:p>
+            <a:r>
+              <a:rPr lang="en-IN" dirty="0"/>
+              <a:t>MFMC: calculates maximum flow possible in constraints and uses that as demand to Network simplex algorithm </a:t>
+            </a:r>
+            <a:r>
+              <a:rPr lang="en-IN" dirty="0" err="1">
+                <a:hlinkClick r:id="rId2"/>
+              </a:rPr>
+              <a:t>networkx.algorithms.flow.mincost</a:t>
+            </a:r>
+            <a:r>
+              <a:rPr lang="en-IN" dirty="0">
+                <a:hlinkClick r:id="rId2"/>
+              </a:rPr>
+              <a:t> — </a:t>
+            </a:r>
+            <a:r>
+              <a:rPr lang="en-IN" dirty="0" err="1">
+                <a:hlinkClick r:id="rId2"/>
+              </a:rPr>
+              <a:t>NetworkX</a:t>
+            </a:r>
+            <a:r>
+              <a:rPr lang="en-IN" dirty="0">
+                <a:hlinkClick r:id="rId2"/>
+              </a:rPr>
+              <a:t> 2.5 documentation</a:t>
+            </a:r>
+            <a:endParaRPr lang="en-IN" dirty="0"/>
+          </a:p>
+          <a:p>
+            <a:r>
+              <a:rPr lang="en-IN" dirty="0"/>
+              <a:t>Network simplex: efficient    </a:t>
+            </a:r>
+            <a:r>
+              <a:rPr lang="en-IN" dirty="0" err="1">
+                <a:hlinkClick r:id="rId3"/>
+              </a:rPr>
+              <a:t>networkx.algorithms.flow.networksimplex</a:t>
+            </a:r>
+            <a:r>
+              <a:rPr lang="en-IN" dirty="0">
+                <a:hlinkClick r:id="rId3"/>
+              </a:rPr>
+              <a:t> — </a:t>
+            </a:r>
+            <a:r>
+              <a:rPr lang="en-IN" dirty="0" err="1">
+                <a:hlinkClick r:id="rId3"/>
+              </a:rPr>
+              <a:t>NetworkX</a:t>
+            </a:r>
+            <a:r>
+              <a:rPr lang="en-IN" dirty="0">
+                <a:hlinkClick r:id="rId3"/>
+              </a:rPr>
+              <a:t> 2.5 documentation</a:t>
+            </a:r>
+            <a:endParaRPr lang="en-IN" dirty="0"/>
+          </a:p>
+          <a:p>
+            <a:r>
+              <a:rPr lang="en-IN" dirty="0"/>
+              <a:t>Cost scaling: completely different, inefficient </a:t>
+            </a:r>
+            <a:r>
+              <a:rPr lang="en-IN" dirty="0" err="1">
+                <a:hlinkClick r:id="rId4"/>
+              </a:rPr>
+              <a:t>networkx.algorithms.flow.capacityscaling</a:t>
+            </a:r>
+            <a:r>
+              <a:rPr lang="en-IN" dirty="0">
+                <a:hlinkClick r:id="rId4"/>
+              </a:rPr>
+              <a:t> — </a:t>
+            </a:r>
+            <a:r>
+              <a:rPr lang="en-IN" dirty="0" err="1">
+                <a:hlinkClick r:id="rId4"/>
+              </a:rPr>
+              <a:t>NetworkX</a:t>
+            </a:r>
+            <a:r>
+              <a:rPr lang="en-IN" dirty="0">
+                <a:hlinkClick r:id="rId4"/>
+              </a:rPr>
+              <a:t> 2.5 documentation</a:t>
+            </a:r>
+            <a:endParaRPr lang="en-IN" dirty="0"/>
+          </a:p>
+          <a:p>
+            <a:endParaRPr lang="en-IN" dirty="0"/>
+          </a:p>
+        </p:txBody>
+      </p:sp>
+    </p:spTree>
+    <p:extLst>
+      <p:ext uri="{BB962C8B-B14F-4D97-AF65-F5344CB8AC3E}">
+        <p14:creationId xmlns:p14="http://schemas.microsoft.com/office/powerpoint/2010/main" val="70312625"/>
       </p:ext>
     </p:extLst>
   </p:cSld>

</xml_diff>